<commit_message>
update presentation add labirinth drawing in excel
</commit_message>
<xml_diff>
--- a/POGramētāji.pptx
+++ b/POGramētāji.pptx
@@ -110,6 +110,11 @@
       </a:defRPr>
     </a:lvl9pPr>
   </p:defaultTextStyle>
+  <p:extLst>
+    <p:ext uri="{EFAFB233-063F-42B5-8137-9DF3F51BA10A}">
+      <p15:sldGuideLst xmlns:p15="http://schemas.microsoft.com/office/powerpoint/2012/main"/>
+    </p:ext>
+  </p:extLst>
 </p:presentation>
 </file>
 
@@ -260,7 +265,7 @@
           <a:p>
             <a:fld id="{D06B4CBD-FBCD-4907-A50A-9B6330D72FEB}" type="datetimeFigureOut">
               <a:rPr lang="en-US" smtClean="0"/>
-              <a:t>12/8/2023</a:t>
+              <a:t>12/8/23</a:t>
             </a:fld>
             <a:endParaRPr lang="en-US"/>
           </a:p>
@@ -458,7 +463,7 @@
           <a:p>
             <a:fld id="{D06B4CBD-FBCD-4907-A50A-9B6330D72FEB}" type="datetimeFigureOut">
               <a:rPr lang="en-US" smtClean="0"/>
-              <a:t>12/8/2023</a:t>
+              <a:t>12/8/23</a:t>
             </a:fld>
             <a:endParaRPr lang="en-US"/>
           </a:p>
@@ -666,7 +671,7 @@
           <a:p>
             <a:fld id="{D06B4CBD-FBCD-4907-A50A-9B6330D72FEB}" type="datetimeFigureOut">
               <a:rPr lang="en-US" smtClean="0"/>
-              <a:t>12/8/2023</a:t>
+              <a:t>12/8/23</a:t>
             </a:fld>
             <a:endParaRPr lang="en-US"/>
           </a:p>
@@ -864,7 +869,7 @@
           <a:p>
             <a:fld id="{D06B4CBD-FBCD-4907-A50A-9B6330D72FEB}" type="datetimeFigureOut">
               <a:rPr lang="en-US" smtClean="0"/>
-              <a:t>12/8/2023</a:t>
+              <a:t>12/8/23</a:t>
             </a:fld>
             <a:endParaRPr lang="en-US"/>
           </a:p>
@@ -1139,7 +1144,7 @@
           <a:p>
             <a:fld id="{D06B4CBD-FBCD-4907-A50A-9B6330D72FEB}" type="datetimeFigureOut">
               <a:rPr lang="en-US" smtClean="0"/>
-              <a:t>12/8/2023</a:t>
+              <a:t>12/8/23</a:t>
             </a:fld>
             <a:endParaRPr lang="en-US"/>
           </a:p>
@@ -1404,7 +1409,7 @@
           <a:p>
             <a:fld id="{D06B4CBD-FBCD-4907-A50A-9B6330D72FEB}" type="datetimeFigureOut">
               <a:rPr lang="en-US" smtClean="0"/>
-              <a:t>12/8/2023</a:t>
+              <a:t>12/8/23</a:t>
             </a:fld>
             <a:endParaRPr lang="en-US"/>
           </a:p>
@@ -1816,7 +1821,7 @@
           <a:p>
             <a:fld id="{D06B4CBD-FBCD-4907-A50A-9B6330D72FEB}" type="datetimeFigureOut">
               <a:rPr lang="en-US" smtClean="0"/>
-              <a:t>12/8/2023</a:t>
+              <a:t>12/8/23</a:t>
             </a:fld>
             <a:endParaRPr lang="en-US"/>
           </a:p>
@@ -1957,7 +1962,7 @@
           <a:p>
             <a:fld id="{D06B4CBD-FBCD-4907-A50A-9B6330D72FEB}" type="datetimeFigureOut">
               <a:rPr lang="en-US" smtClean="0"/>
-              <a:t>12/8/2023</a:t>
+              <a:t>12/8/23</a:t>
             </a:fld>
             <a:endParaRPr lang="en-US"/>
           </a:p>
@@ -2070,7 +2075,7 @@
           <a:p>
             <a:fld id="{D06B4CBD-FBCD-4907-A50A-9B6330D72FEB}" type="datetimeFigureOut">
               <a:rPr lang="en-US" smtClean="0"/>
-              <a:t>12/8/2023</a:t>
+              <a:t>12/8/23</a:t>
             </a:fld>
             <a:endParaRPr lang="en-US"/>
           </a:p>
@@ -2381,7 +2386,7 @@
           <a:p>
             <a:fld id="{D06B4CBD-FBCD-4907-A50A-9B6330D72FEB}" type="datetimeFigureOut">
               <a:rPr lang="en-US" smtClean="0"/>
-              <a:t>12/8/2023</a:t>
+              <a:t>12/8/23</a:t>
             </a:fld>
             <a:endParaRPr lang="en-US"/>
           </a:p>
@@ -2669,7 +2674,7 @@
           <a:p>
             <a:fld id="{D06B4CBD-FBCD-4907-A50A-9B6330D72FEB}" type="datetimeFigureOut">
               <a:rPr lang="en-US" smtClean="0"/>
-              <a:t>12/8/2023</a:t>
+              <a:t>12/8/23</a:t>
             </a:fld>
             <a:endParaRPr lang="en-US"/>
           </a:p>
@@ -2920,7 +2925,7 @@
           <a:p>
             <a:fld id="{D06B4CBD-FBCD-4907-A50A-9B6330D72FEB}" type="datetimeFigureOut">
               <a:rPr lang="en-US" smtClean="0"/>
-              <a:t>12/8/2023</a:t>
+              <a:t>12/8/23</a:t>
             </a:fld>
             <a:endParaRPr lang="en-US"/>
           </a:p>
@@ -3576,6 +3581,14 @@
             </a:r>
           </a:p>
           <a:p>
+            <a:pPr>
+              <a:lnSpc>
+                <a:spcPct val="150000"/>
+              </a:lnSpc>
+              <a:spcAft>
+                <a:spcPts val="800"/>
+              </a:spcAft>
+            </a:pPr>
             <a:r>
               <a:rPr lang="lv-LV" dirty="0">
                 <a:latin typeface="Times New Roman" panose="02020603050405020304" pitchFamily="18" charset="0"/>
@@ -3585,13 +3598,135 @@
             </a:r>
             <a:r>
               <a:rPr lang="lv-LV" dirty="0" err="1">
+                <a:effectLst/>
                 <a:latin typeface="Times New Roman" panose="02020603050405020304" pitchFamily="18" charset="0"/>
-                <a:cs typeface="Times New Roman" panose="02020603050405020304" pitchFamily="18" charset="0"/>
-              </a:rPr>
-              <a:t>stmh</a:t>
-            </a:r>
-            <a:endParaRPr lang="lv-LV" dirty="0">
+                <a:ea typeface="Calibri" panose="020F0502020204030204" pitchFamily="34" charset="0"/>
+                <a:cs typeface="Times New Roman" panose="02020603050405020304" pitchFamily="18" charset="0"/>
+              </a:rPr>
+              <a:t>Attelo</a:t>
+            </a:r>
+            <a:r>
+              <a:rPr lang="lv-LV" dirty="0">
+                <a:latin typeface="Times New Roman" panose="02020603050405020304" pitchFamily="18" charset="0"/>
+                <a:ea typeface="Calibri" panose="020F0502020204030204" pitchFamily="34" charset="0"/>
+                <a:cs typeface="Times New Roman" panose="02020603050405020304" pitchFamily="18" charset="0"/>
+              </a:rPr>
+              <a:t> labirintu kā grafu, izmanto </a:t>
+            </a:r>
+            <a:r>
+              <a:rPr lang="en-GB" b="0" i="0" u="none" strike="noStrike" dirty="0" err="1">
+                <a:solidFill>
+                  <a:srgbClr val="000000"/>
+                </a:solidFill>
+                <a:effectLst/>
+                <a:latin typeface="Times New Roman" panose="02020603050405020304" pitchFamily="18" charset="0"/>
+                <a:cs typeface="Times New Roman" panose="02020603050405020304" pitchFamily="18" charset="0"/>
+              </a:rPr>
+              <a:t>Deikstras</a:t>
+            </a:r>
+            <a:r>
+              <a:rPr lang="en-GB" b="0" i="0" u="none" strike="noStrike" dirty="0">
+                <a:solidFill>
+                  <a:srgbClr val="000000"/>
+                </a:solidFill>
+                <a:effectLst/>
+                <a:latin typeface="Times New Roman" panose="02020603050405020304" pitchFamily="18" charset="0"/>
+                <a:cs typeface="Times New Roman" panose="02020603050405020304" pitchFamily="18" charset="0"/>
+              </a:rPr>
+              <a:t> </a:t>
+            </a:r>
+            <a:r>
+              <a:rPr lang="en-GB" b="0" i="0" u="none" strike="noStrike" dirty="0" err="1">
+                <a:solidFill>
+                  <a:srgbClr val="000000"/>
+                </a:solidFill>
+                <a:effectLst/>
+                <a:latin typeface="Times New Roman" panose="02020603050405020304" pitchFamily="18" charset="0"/>
+                <a:cs typeface="Times New Roman" panose="02020603050405020304" pitchFamily="18" charset="0"/>
+              </a:rPr>
+              <a:t>algoritmu</a:t>
+            </a:r>
+            <a:r>
+              <a:rPr lang="en-GB" b="0" i="0" u="none" strike="noStrike" dirty="0">
+                <a:solidFill>
+                  <a:srgbClr val="000000"/>
+                </a:solidFill>
+                <a:effectLst/>
+                <a:latin typeface="Times New Roman" panose="02020603050405020304" pitchFamily="18" charset="0"/>
+                <a:cs typeface="Times New Roman" panose="02020603050405020304" pitchFamily="18" charset="0"/>
+              </a:rPr>
+              <a:t> </a:t>
+            </a:r>
+            <a:r>
+              <a:rPr lang="en-GB" b="0" i="0" u="none" strike="noStrike" dirty="0" err="1">
+                <a:solidFill>
+                  <a:srgbClr val="000000"/>
+                </a:solidFill>
+                <a:effectLst/>
+                <a:latin typeface="Times New Roman" panose="02020603050405020304" pitchFamily="18" charset="0"/>
+                <a:cs typeface="Times New Roman" panose="02020603050405020304" pitchFamily="18" charset="0"/>
+              </a:rPr>
+              <a:t>īsāka</a:t>
+            </a:r>
+            <a:r>
+              <a:rPr lang="en-GB" b="0" i="0" u="none" strike="noStrike" dirty="0">
+                <a:solidFill>
+                  <a:srgbClr val="000000"/>
+                </a:solidFill>
+                <a:effectLst/>
+                <a:latin typeface="Times New Roman" panose="02020603050405020304" pitchFamily="18" charset="0"/>
+                <a:cs typeface="Times New Roman" panose="02020603050405020304" pitchFamily="18" charset="0"/>
+              </a:rPr>
+              <a:t> </a:t>
+            </a:r>
+            <a:r>
+              <a:rPr lang="en-GB" b="0" i="0" u="none" strike="noStrike" dirty="0" err="1">
+                <a:solidFill>
+                  <a:srgbClr val="000000"/>
+                </a:solidFill>
+                <a:effectLst/>
+                <a:latin typeface="Times New Roman" panose="02020603050405020304" pitchFamily="18" charset="0"/>
+                <a:cs typeface="Times New Roman" panose="02020603050405020304" pitchFamily="18" charset="0"/>
+              </a:rPr>
+              <a:t>ceļa</a:t>
+            </a:r>
+            <a:r>
+              <a:rPr lang="en-GB" b="0" i="0" u="none" strike="noStrike" dirty="0">
+                <a:solidFill>
+                  <a:srgbClr val="000000"/>
+                </a:solidFill>
+                <a:effectLst/>
+                <a:latin typeface="Times New Roman" panose="02020603050405020304" pitchFamily="18" charset="0"/>
+                <a:cs typeface="Times New Roman" panose="02020603050405020304" pitchFamily="18" charset="0"/>
+              </a:rPr>
+              <a:t> </a:t>
+            </a:r>
+            <a:r>
+              <a:rPr lang="en-GB" b="0" i="0" u="none" strike="noStrike" dirty="0" err="1">
+                <a:solidFill>
+                  <a:srgbClr val="000000"/>
+                </a:solidFill>
+                <a:effectLst/>
+                <a:latin typeface="Times New Roman" panose="02020603050405020304" pitchFamily="18" charset="0"/>
+                <a:cs typeface="Times New Roman" panose="02020603050405020304" pitchFamily="18" charset="0"/>
+              </a:rPr>
+              <a:t>mēklēšanai</a:t>
+            </a:r>
+            <a:r>
+              <a:rPr lang="en-GB" b="0" i="0" u="none" strike="noStrike" dirty="0">
+                <a:solidFill>
+                  <a:srgbClr val="000000"/>
+                </a:solidFill>
+                <a:effectLst/>
+                <a:latin typeface="Times New Roman" panose="02020603050405020304" pitchFamily="18" charset="0"/>
+                <a:cs typeface="Times New Roman" panose="02020603050405020304" pitchFamily="18" charset="0"/>
+              </a:rPr>
+              <a:t> </a:t>
+            </a:r>
+            <a:endParaRPr lang="en-LV" dirty="0">
+              <a:effectLst/>
               <a:latin typeface="Times New Roman" panose="02020603050405020304" pitchFamily="18" charset="0"/>
+              <a:ea typeface="Calibri" panose="020F0502020204030204" pitchFamily="34" charset="0"/>
               <a:cs typeface="Times New Roman" panose="02020603050405020304" pitchFamily="18" charset="0"/>
             </a:endParaRPr>
           </a:p>
@@ -4048,6 +4183,42 @@
           </a:p>
         </p:txBody>
       </p:sp>
+      <p:pic>
+        <p:nvPicPr>
+          <p:cNvPr id="4" name="Picture 3" descr="A crossword puzzle with black squares&#10;&#10;Description automatically generated">
+            <a:extLst>
+              <a:ext uri="{FF2B5EF4-FFF2-40B4-BE49-F238E27FC236}">
+                <a16:creationId xmlns:a16="http://schemas.microsoft.com/office/drawing/2014/main" id="{1E498D02-B75D-D5BD-9251-BE2C15546315}"/>
+              </a:ext>
+            </a:extLst>
+          </p:cNvPr>
+          <p:cNvPicPr>
+            <a:picLocks noChangeAspect="1"/>
+          </p:cNvPicPr>
+          <p:nvPr/>
+        </p:nvPicPr>
+        <p:blipFill>
+          <a:blip r:embed="rId4">
+            <a:extLst>
+              <a:ext uri="{28A0092B-C50C-407E-A947-70E740481C1C}">
+                <a14:useLocalDpi xmlns:a14="http://schemas.microsoft.com/office/drawing/2010/main" val="0"/>
+              </a:ext>
+            </a:extLst>
+          </a:blip>
+          <a:stretch>
+            <a:fillRect/>
+          </a:stretch>
+        </p:blipFill>
+        <p:spPr>
+          <a:xfrm>
+            <a:off x="327135" y="1908122"/>
+            <a:ext cx="3611127" cy="3600000"/>
+          </a:xfrm>
+          <a:prstGeom prst="rect">
+            <a:avLst/>
+          </a:prstGeom>
+        </p:spPr>
+      </p:pic>
     </p:spTree>
     <p:extLst>
       <p:ext uri="{BB962C8B-B14F-4D97-AF65-F5344CB8AC3E}">
@@ -4440,6 +4611,42 @@
           </a:p>
         </p:txBody>
       </p:sp>
+      <p:pic>
+        <p:nvPicPr>
+          <p:cNvPr id="5" name="Picture 4" descr="A square black and white crossword puzzle&#10;&#10;Description automatically generated">
+            <a:extLst>
+              <a:ext uri="{FF2B5EF4-FFF2-40B4-BE49-F238E27FC236}">
+                <a16:creationId xmlns:a16="http://schemas.microsoft.com/office/drawing/2014/main" id="{F0BB21D5-C1BB-F7E8-3D26-84833707DF5F}"/>
+              </a:ext>
+            </a:extLst>
+          </p:cNvPr>
+          <p:cNvPicPr>
+            <a:picLocks noChangeAspect="1"/>
+          </p:cNvPicPr>
+          <p:nvPr/>
+        </p:nvPicPr>
+        <p:blipFill>
+          <a:blip r:embed="rId4">
+            <a:extLst>
+              <a:ext uri="{28A0092B-C50C-407E-A947-70E740481C1C}">
+                <a14:useLocalDpi xmlns:a14="http://schemas.microsoft.com/office/drawing/2010/main" val="0"/>
+              </a:ext>
+            </a:extLst>
+          </a:blip>
+          <a:stretch>
+            <a:fillRect/>
+          </a:stretch>
+        </p:blipFill>
+        <p:spPr>
+          <a:xfrm>
+            <a:off x="4157617" y="1910232"/>
+            <a:ext cx="3776039" cy="3605706"/>
+          </a:xfrm>
+          <a:prstGeom prst="rect">
+            <a:avLst/>
+          </a:prstGeom>
+        </p:spPr>
+      </p:pic>
     </p:spTree>
     <p:extLst>
       <p:ext uri="{BB962C8B-B14F-4D97-AF65-F5344CB8AC3E}">
@@ -4832,6 +5039,42 @@
           </a:p>
         </p:txBody>
       </p:sp>
+      <p:pic>
+        <p:nvPicPr>
+          <p:cNvPr id="5" name="Picture 4" descr="A maze with a green center&#10;&#10;Description automatically generated">
+            <a:extLst>
+              <a:ext uri="{FF2B5EF4-FFF2-40B4-BE49-F238E27FC236}">
+                <a16:creationId xmlns:a16="http://schemas.microsoft.com/office/drawing/2014/main" id="{3F5EBF5D-65C5-8ABF-C16A-8C562C3B4EAA}"/>
+              </a:ext>
+            </a:extLst>
+          </p:cNvPr>
+          <p:cNvPicPr>
+            <a:picLocks noChangeAspect="1"/>
+          </p:cNvPicPr>
+          <p:nvPr/>
+        </p:nvPicPr>
+        <p:blipFill>
+          <a:blip r:embed="rId4">
+            <a:extLst>
+              <a:ext uri="{28A0092B-C50C-407E-A947-70E740481C1C}">
+                <a14:useLocalDpi xmlns:a14="http://schemas.microsoft.com/office/drawing/2010/main" val="0"/>
+              </a:ext>
+            </a:extLst>
+          </a:blip>
+          <a:stretch>
+            <a:fillRect/>
+          </a:stretch>
+        </p:blipFill>
+        <p:spPr>
+          <a:xfrm>
+            <a:off x="8181759" y="1910099"/>
+            <a:ext cx="3677543" cy="3602986"/>
+          </a:xfrm>
+          <a:prstGeom prst="rect">
+            <a:avLst/>
+          </a:prstGeom>
+        </p:spPr>
+      </p:pic>
     </p:spTree>
     <p:extLst>
       <p:ext uri="{BB962C8B-B14F-4D97-AF65-F5344CB8AC3E}">

</xml_diff>